<commit_message>
Fix errors in lecture 14 recap slide
</commit_message>
<xml_diff>
--- a/ex/352-S22/staging/352-S22/lectures/14-tp-flow-control.pptx
+++ b/ex/352-S22/staging/352-S22/lectures/14-tp-flow-control.pptx
@@ -222,7 +222,7 @@
           <a:p>
             <a:fld id="{973C490B-630B-7F46-B6FE-05D0FD1689A8}" type="datetimeFigureOut">
               <a:rPr lang="en-US" smtClean="0"/>
-              <a:t>3/7/22</a:t>
+              <a:t>3/10/22</a:t>
             </a:fld>
             <a:endParaRPr lang="en-US"/>
           </a:p>
@@ -636,7 +636,7 @@
           <a:p>
             <a:fld id="{DEDCE603-2B12-5844-BEA7-E98E825B38C7}" type="datetimeFigureOut">
               <a:rPr lang="en-US" smtClean="0"/>
-              <a:t>3/7/22</a:t>
+              <a:t>3/10/22</a:t>
             </a:fld>
             <a:endParaRPr lang="en-US"/>
           </a:p>
@@ -834,7 +834,7 @@
           <a:p>
             <a:fld id="{DEDCE603-2B12-5844-BEA7-E98E825B38C7}" type="datetimeFigureOut">
               <a:rPr lang="en-US" smtClean="0"/>
-              <a:t>3/7/22</a:t>
+              <a:t>3/10/22</a:t>
             </a:fld>
             <a:endParaRPr lang="en-US"/>
           </a:p>
@@ -1042,7 +1042,7 @@
           <a:p>
             <a:fld id="{DEDCE603-2B12-5844-BEA7-E98E825B38C7}" type="datetimeFigureOut">
               <a:rPr lang="en-US" smtClean="0"/>
-              <a:t>3/7/22</a:t>
+              <a:t>3/10/22</a:t>
             </a:fld>
             <a:endParaRPr lang="en-US"/>
           </a:p>
@@ -1251,7 +1251,7 @@
           <a:p>
             <a:fld id="{DEDCE603-2B12-5844-BEA7-E98E825B38C7}" type="datetimeFigureOut">
               <a:rPr lang="en-US" smtClean="0"/>
-              <a:t>3/7/22</a:t>
+              <a:t>3/10/22</a:t>
             </a:fld>
             <a:endParaRPr lang="en-US"/>
           </a:p>
@@ -1526,7 +1526,7 @@
           <a:p>
             <a:fld id="{DEDCE603-2B12-5844-BEA7-E98E825B38C7}" type="datetimeFigureOut">
               <a:rPr lang="en-US" smtClean="0"/>
-              <a:t>3/7/22</a:t>
+              <a:t>3/10/22</a:t>
             </a:fld>
             <a:endParaRPr lang="en-US"/>
           </a:p>
@@ -1791,7 +1791,7 @@
           <a:p>
             <a:fld id="{DEDCE603-2B12-5844-BEA7-E98E825B38C7}" type="datetimeFigureOut">
               <a:rPr lang="en-US" smtClean="0"/>
-              <a:t>3/7/22</a:t>
+              <a:t>3/10/22</a:t>
             </a:fld>
             <a:endParaRPr lang="en-US"/>
           </a:p>
@@ -2203,7 +2203,7 @@
           <a:p>
             <a:fld id="{DEDCE603-2B12-5844-BEA7-E98E825B38C7}" type="datetimeFigureOut">
               <a:rPr lang="en-US" smtClean="0"/>
-              <a:t>3/7/22</a:t>
+              <a:t>3/10/22</a:t>
             </a:fld>
             <a:endParaRPr lang="en-US"/>
           </a:p>
@@ -2344,7 +2344,7 @@
           <a:p>
             <a:fld id="{DEDCE603-2B12-5844-BEA7-E98E825B38C7}" type="datetimeFigureOut">
               <a:rPr lang="en-US" smtClean="0"/>
-              <a:t>3/7/22</a:t>
+              <a:t>3/10/22</a:t>
             </a:fld>
             <a:endParaRPr lang="en-US"/>
           </a:p>
@@ -2457,7 +2457,7 @@
           <a:p>
             <a:fld id="{DEDCE603-2B12-5844-BEA7-E98E825B38C7}" type="datetimeFigureOut">
               <a:rPr lang="en-US" smtClean="0"/>
-              <a:t>3/7/22</a:t>
+              <a:t>3/10/22</a:t>
             </a:fld>
             <a:endParaRPr lang="en-US"/>
           </a:p>
@@ -2768,7 +2768,7 @@
           <a:p>
             <a:fld id="{DEDCE603-2B12-5844-BEA7-E98E825B38C7}" type="datetimeFigureOut">
               <a:rPr lang="en-US" smtClean="0"/>
-              <a:t>3/7/22</a:t>
+              <a:t>3/10/22</a:t>
             </a:fld>
             <a:endParaRPr lang="en-US"/>
           </a:p>
@@ -3056,7 +3056,7 @@
           <a:p>
             <a:fld id="{DEDCE603-2B12-5844-BEA7-E98E825B38C7}" type="datetimeFigureOut">
               <a:rPr lang="en-US" smtClean="0"/>
-              <a:t>3/7/22</a:t>
+              <a:t>3/10/22</a:t>
             </a:fld>
             <a:endParaRPr lang="en-US"/>
           </a:p>
@@ -3297,7 +3297,7 @@
           <a:p>
             <a:fld id="{DEDCE603-2B12-5844-BEA7-E98E825B38C7}" type="datetimeFigureOut">
               <a:rPr lang="en-US" smtClean="0"/>
-              <a:t>3/7/22</a:t>
+              <a:t>3/10/22</a:t>
             </a:fld>
             <a:endParaRPr lang="en-US"/>
           </a:p>
@@ -25044,7 +25044,7 @@
                 </a:solidFill>
                 <a:latin typeface="Helvetica" pitchFamily="2" charset="0"/>
               </a:rPr>
-              <a:t>&lt;</a:t>
+              <a:t>&gt;</a:t>
             </a:r>
           </a:p>
         </p:txBody>
@@ -25085,7 +25085,7 @@
                 </a:solidFill>
                 <a:latin typeface="Helvetica" pitchFamily="2" charset="0"/>
               </a:rPr>
-              <a:t>&gt;</a:t>
+              <a:t>&lt;</a:t>
             </a:r>
           </a:p>
         </p:txBody>

</xml_diff>